<commit_message>
Add QR code to presentation slides
</commit_message>
<xml_diff>
--- a/assets/slides/Agentic_AI_Google_Ecosystem.pptx
+++ b/assets/slides/Agentic_AI_Google_Ecosystem.pptx
@@ -5,7 +5,7 @@
     <p:sldMasterId id="2147483660" r:id="rId1"/>
   </p:sldMasterIdLst>
   <p:notesMasterIdLst>
-    <p:notesMasterId r:id="rId25"/>
+    <p:notesMasterId r:id="rId26"/>
   </p:notesMasterIdLst>
   <p:sldIdLst>
     <p:sldId id="256" r:id="rId2"/>
@@ -31,6 +31,7 @@
     <p:sldId id="269" r:id="rId22"/>
     <p:sldId id="270" r:id="rId23"/>
     <p:sldId id="271" r:id="rId24"/>
+    <p:sldId id="279" r:id="rId25"/>
   </p:sldIdLst>
   <p:sldSz cx="9144000" cy="6858000" type="screen4x3"/>
   <p:notesSz cx="6858000" cy="9144000"/>
@@ -612,6 +613,13 @@
               <a:schemeClr val="lt1"/>
             </a:fontRef>
           </p:style>
+          <p:txBody>
+            <a:bodyPr/>
+            <a:lstStyle/>
+            <a:p>
+              <a:endParaRPr lang="en-US"/>
+            </a:p>
+          </p:txBody>
         </p:sp>
         <p:sp>
           <p:nvSpPr>
@@ -677,6 +685,13 @@
               <a:schemeClr val="lt1"/>
             </a:fontRef>
           </p:style>
+          <p:txBody>
+            <a:bodyPr/>
+            <a:lstStyle/>
+            <a:p>
+              <a:endParaRPr lang="en-US"/>
+            </a:p>
+          </p:txBody>
         </p:sp>
         <p:sp>
           <p:nvSpPr>
@@ -739,6 +754,13 @@
               <a:schemeClr val="lt1"/>
             </a:fontRef>
           </p:style>
+          <p:txBody>
+            <a:bodyPr/>
+            <a:lstStyle/>
+            <a:p>
+              <a:endParaRPr lang="en-US"/>
+            </a:p>
+          </p:txBody>
         </p:sp>
         <p:sp>
           <p:nvSpPr>
@@ -803,6 +825,13 @@
               <a:schemeClr val="lt1"/>
             </a:fontRef>
           </p:style>
+          <p:txBody>
+            <a:bodyPr/>
+            <a:lstStyle/>
+            <a:p>
+              <a:endParaRPr lang="en-US"/>
+            </a:p>
+          </p:txBody>
         </p:sp>
         <p:sp>
           <p:nvSpPr>
@@ -870,6 +899,13 @@
               <a:schemeClr val="lt1"/>
             </a:fontRef>
           </p:style>
+          <p:txBody>
+            <a:bodyPr/>
+            <a:lstStyle/>
+            <a:p>
+              <a:endParaRPr lang="en-US"/>
+            </a:p>
+          </p:txBody>
         </p:sp>
         <p:sp>
           <p:nvSpPr>
@@ -935,6 +971,13 @@
               <a:schemeClr val="lt1"/>
             </a:fontRef>
           </p:style>
+          <p:txBody>
+            <a:bodyPr/>
+            <a:lstStyle/>
+            <a:p>
+              <a:endParaRPr lang="en-US"/>
+            </a:p>
+          </p:txBody>
         </p:sp>
         <p:sp>
           <p:nvSpPr>
@@ -997,6 +1040,13 @@
               <a:schemeClr val="lt1"/>
             </a:fontRef>
           </p:style>
+          <p:txBody>
+            <a:bodyPr/>
+            <a:lstStyle/>
+            <a:p>
+              <a:endParaRPr lang="en-US"/>
+            </a:p>
+          </p:txBody>
         </p:sp>
         <p:sp>
           <p:nvSpPr>
@@ -1060,6 +1110,13 @@
               <a:schemeClr val="lt1"/>
             </a:fontRef>
           </p:style>
+          <p:txBody>
+            <a:bodyPr/>
+            <a:lstStyle/>
+            <a:p>
+              <a:endParaRPr lang="en-US"/>
+            </a:p>
+          </p:txBody>
         </p:sp>
       </p:grpSp>
       <p:sp>
@@ -5179,6 +5236,13 @@
               <a:schemeClr val="lt1"/>
             </a:fontRef>
           </p:style>
+          <p:txBody>
+            <a:bodyPr/>
+            <a:lstStyle/>
+            <a:p>
+              <a:endParaRPr lang="en-US"/>
+            </a:p>
+          </p:txBody>
         </p:sp>
         <p:cxnSp>
           <p:nvCxnSpPr>
@@ -5318,6 +5382,13 @@
               <a:schemeClr val="lt1"/>
             </a:fontRef>
           </p:style>
+          <p:txBody>
+            <a:bodyPr/>
+            <a:lstStyle/>
+            <a:p>
+              <a:endParaRPr lang="en-US"/>
+            </a:p>
+          </p:txBody>
         </p:sp>
         <p:sp>
           <p:nvSpPr>
@@ -5383,6 +5454,13 @@
               <a:schemeClr val="lt1"/>
             </a:fontRef>
           </p:style>
+          <p:txBody>
+            <a:bodyPr/>
+            <a:lstStyle/>
+            <a:p>
+              <a:endParaRPr lang="en-US"/>
+            </a:p>
+          </p:txBody>
         </p:sp>
         <p:sp>
           <p:nvSpPr>
@@ -5445,6 +5523,13 @@
               <a:schemeClr val="lt1"/>
             </a:fontRef>
           </p:style>
+          <p:txBody>
+            <a:bodyPr/>
+            <a:lstStyle/>
+            <a:p>
+              <a:endParaRPr lang="en-US"/>
+            </a:p>
+          </p:txBody>
         </p:sp>
         <p:sp>
           <p:nvSpPr>
@@ -5509,6 +5594,13 @@
               <a:schemeClr val="lt1"/>
             </a:fontRef>
           </p:style>
+          <p:txBody>
+            <a:bodyPr/>
+            <a:lstStyle/>
+            <a:p>
+              <a:endParaRPr lang="en-US"/>
+            </a:p>
+          </p:txBody>
         </p:sp>
         <p:sp>
           <p:nvSpPr>
@@ -5576,6 +5668,13 @@
               <a:schemeClr val="lt1"/>
             </a:fontRef>
           </p:style>
+          <p:txBody>
+            <a:bodyPr/>
+            <a:lstStyle/>
+            <a:p>
+              <a:endParaRPr lang="en-US"/>
+            </a:p>
+          </p:txBody>
         </p:sp>
         <p:sp>
           <p:nvSpPr>
@@ -5641,6 +5740,13 @@
               <a:schemeClr val="lt1"/>
             </a:fontRef>
           </p:style>
+          <p:txBody>
+            <a:bodyPr/>
+            <a:lstStyle/>
+            <a:p>
+              <a:endParaRPr lang="en-US"/>
+            </a:p>
+          </p:txBody>
         </p:sp>
         <p:sp>
           <p:nvSpPr>
@@ -5703,6 +5809,13 @@
               <a:schemeClr val="lt1"/>
             </a:fontRef>
           </p:style>
+          <p:txBody>
+            <a:bodyPr/>
+            <a:lstStyle/>
+            <a:p>
+              <a:endParaRPr lang="en-US"/>
+            </a:p>
+          </p:txBody>
         </p:sp>
       </p:grpSp>
       <p:sp>
@@ -6411,6 +6524,36 @@
           </a:p>
         </p:txBody>
       </p:sp>
+      <p:pic>
+        <p:nvPicPr>
+          <p:cNvPr id="6" name="Picture 5">
+            <a:extLst>
+              <a:ext uri="{FF2B5EF4-FFF2-40B4-BE49-F238E27FC236}">
+                <a16:creationId xmlns:a16="http://schemas.microsoft.com/office/drawing/2014/main" id="{37D4C712-461E-2152-7D4C-1FA32385D39B}"/>
+              </a:ext>
+            </a:extLst>
+          </p:cNvPr>
+          <p:cNvPicPr>
+            <a:picLocks noChangeAspect="1"/>
+          </p:cNvPicPr>
+          <p:nvPr/>
+        </p:nvPicPr>
+        <p:blipFill>
+          <a:blip r:embed="rId3"/>
+          <a:stretch>
+            <a:fillRect/>
+          </a:stretch>
+        </p:blipFill>
+        <p:spPr>
+          <a:xfrm>
+            <a:off x="27523" y="4372926"/>
+            <a:ext cx="2159163" cy="2485074"/>
+          </a:xfrm>
+          <a:prstGeom prst="rect">
+            <a:avLst/>
+          </a:prstGeom>
+        </p:spPr>
+      </p:pic>
     </p:spTree>
   </p:cSld>
   <p:clrMapOvr>
@@ -8341,6 +8484,94 @@
         </p:txBody>
       </p:sp>
     </p:spTree>
+  </p:cSld>
+  <p:clrMapOvr>
+    <a:masterClrMapping/>
+  </p:clrMapOvr>
+</p:sld>
+</file>
+
+<file path=ppt/slides/slide24.xml><?xml version="1.0" encoding="utf-8"?>
+<p:sld xmlns:a="http://schemas.openxmlformats.org/drawingml/2006/main" xmlns:r="http://schemas.openxmlformats.org/officeDocument/2006/relationships" xmlns:p="http://schemas.openxmlformats.org/presentationml/2006/main">
+  <p:cSld>
+    <p:spTree>
+      <p:nvGrpSpPr>
+        <p:cNvPr id="1" name=""/>
+        <p:cNvGrpSpPr/>
+        <p:nvPr/>
+      </p:nvGrpSpPr>
+      <p:grpSpPr>
+        <a:xfrm>
+          <a:off x="0" y="0"/>
+          <a:ext cx="0" cy="0"/>
+          <a:chOff x="0" y="0"/>
+          <a:chExt cx="0" cy="0"/>
+        </a:xfrm>
+      </p:grpSpPr>
+      <p:sp>
+        <p:nvSpPr>
+          <p:cNvPr id="2" name="Title 1">
+            <a:extLst>
+              <a:ext uri="{FF2B5EF4-FFF2-40B4-BE49-F238E27FC236}">
+                <a16:creationId xmlns:a16="http://schemas.microsoft.com/office/drawing/2014/main" id="{64FAD5B1-F180-4F23-40B9-A208587D402E}"/>
+              </a:ext>
+            </a:extLst>
+          </p:cNvPr>
+          <p:cNvSpPr>
+            <a:spLocks noGrp="1"/>
+          </p:cNvSpPr>
+          <p:nvPr>
+            <p:ph type="title"/>
+          </p:nvPr>
+        </p:nvSpPr>
+        <p:spPr/>
+        <p:txBody>
+          <a:bodyPr/>
+          <a:lstStyle/>
+          <a:p>
+            <a:r>
+              <a:rPr lang="en-US" dirty="0"/>
+              <a:t>Materials</a:t>
+            </a:r>
+          </a:p>
+        </p:txBody>
+      </p:sp>
+      <p:pic>
+        <p:nvPicPr>
+          <p:cNvPr id="5" name="Picture 4">
+            <a:extLst>
+              <a:ext uri="{FF2B5EF4-FFF2-40B4-BE49-F238E27FC236}">
+                <a16:creationId xmlns:a16="http://schemas.microsoft.com/office/drawing/2014/main" id="{9C596689-6C70-DB78-9FD2-CCCEC1176BAD}"/>
+              </a:ext>
+            </a:extLst>
+          </p:cNvPr>
+          <p:cNvPicPr>
+            <a:picLocks noChangeAspect="1"/>
+          </p:cNvPicPr>
+          <p:nvPr/>
+        </p:nvPicPr>
+        <p:blipFill>
+          <a:blip r:embed="rId2"/>
+          <a:stretch>
+            <a:fillRect/>
+          </a:stretch>
+        </p:blipFill>
+        <p:spPr>
+          <a:xfrm>
+            <a:off x="1592705" y="1244338"/>
+            <a:ext cx="4877444" cy="5613662"/>
+          </a:xfrm>
+          <a:prstGeom prst="rect">
+            <a:avLst/>
+          </a:prstGeom>
+        </p:spPr>
+      </p:pic>
+    </p:spTree>
+    <p:extLst>
+      <p:ext uri="{BB962C8B-B14F-4D97-AF65-F5344CB8AC3E}">
+        <p14:creationId xmlns:p14="http://schemas.microsoft.com/office/powerpoint/2010/main" val="3318869769"/>
+      </p:ext>
+    </p:extLst>
   </p:cSld>
   <p:clrMapOvr>
     <a:masterClrMapping/>

</xml_diff>